<commit_message>
figure fixed in ppt for import into the manuscript
</commit_message>
<xml_diff>
--- a/docs/papers/release/Figures/High-level terms.pptx
+++ b/docs/papers/release/Figures/High-level terms.pptx
@@ -193,7 +193,8 @@
           <a:p>
             <a:fld id="{DCB0F01B-B7FE-4268-A005-AB7D5822BC14}" type="datetimeFigureOut">
               <a:rPr lang="en-US" smtClean="0"/>
-              <a:t>7/23/2009</a:t>
+              <a:pPr/>
+              <a:t>10/18/2009</a:t>
             </a:fld>
             <a:endParaRPr lang="en-US"/>
           </a:p>
@@ -354,6 +355,7 @@
           <a:p>
             <a:fld id="{6B4D57C2-B9C7-4FE0-9DB9-7EC7F64D7582}" type="slidenum">
               <a:rPr lang="en-US" smtClean="0"/>
+              <a:pPr/>
               <a:t>‹#›</a:t>
             </a:fld>
             <a:endParaRPr lang="en-US"/>
@@ -525,6 +527,7 @@
           <a:p>
             <a:fld id="{6B4D57C2-B9C7-4FE0-9DB9-7EC7F64D7582}" type="slidenum">
               <a:rPr lang="en-US" smtClean="0"/>
+              <a:pPr/>
               <a:t>1</a:t>
             </a:fld>
             <a:endParaRPr lang="en-US"/>
@@ -606,6 +609,7 @@
           <a:p>
             <a:fld id="{6B4D57C2-B9C7-4FE0-9DB9-7EC7F64D7582}" type="slidenum">
               <a:rPr lang="en-US" smtClean="0"/>
+              <a:pPr/>
               <a:t>2</a:t>
             </a:fld>
             <a:endParaRPr lang="en-US"/>
@@ -802,7 +806,7 @@
             <a:fld id="{1D8BD707-D9CF-40AE-B4C6-C98DA3205C09}" type="datetimeFigureOut">
               <a:rPr lang="en-US" smtClean="0"/>
               <a:pPr/>
-              <a:t>7/23/2009</a:t>
+              <a:t>10/18/2009</a:t>
             </a:fld>
             <a:endParaRPr lang="en-US"/>
           </a:p>
@@ -969,7 +973,7 @@
             <a:fld id="{1D8BD707-D9CF-40AE-B4C6-C98DA3205C09}" type="datetimeFigureOut">
               <a:rPr lang="en-US" smtClean="0"/>
               <a:pPr/>
-              <a:t>7/23/2009</a:t>
+              <a:t>10/18/2009</a:t>
             </a:fld>
             <a:endParaRPr lang="en-US"/>
           </a:p>
@@ -1146,7 +1150,7 @@
             <a:fld id="{1D8BD707-D9CF-40AE-B4C6-C98DA3205C09}" type="datetimeFigureOut">
               <a:rPr lang="en-US" smtClean="0"/>
               <a:pPr/>
-              <a:t>7/23/2009</a:t>
+              <a:t>10/18/2009</a:t>
             </a:fld>
             <a:endParaRPr lang="en-US"/>
           </a:p>
@@ -1313,7 +1317,7 @@
             <a:fld id="{1D8BD707-D9CF-40AE-B4C6-C98DA3205C09}" type="datetimeFigureOut">
               <a:rPr lang="en-US" smtClean="0"/>
               <a:pPr/>
-              <a:t>7/23/2009</a:t>
+              <a:t>10/18/2009</a:t>
             </a:fld>
             <a:endParaRPr lang="en-US"/>
           </a:p>
@@ -1556,7 +1560,7 @@
             <a:fld id="{1D8BD707-D9CF-40AE-B4C6-C98DA3205C09}" type="datetimeFigureOut">
               <a:rPr lang="en-US" smtClean="0"/>
               <a:pPr/>
-              <a:t>7/23/2009</a:t>
+              <a:t>10/18/2009</a:t>
             </a:fld>
             <a:endParaRPr lang="en-US"/>
           </a:p>
@@ -1841,7 +1845,7 @@
             <a:fld id="{1D8BD707-D9CF-40AE-B4C6-C98DA3205C09}" type="datetimeFigureOut">
               <a:rPr lang="en-US" smtClean="0"/>
               <a:pPr/>
-              <a:t>7/23/2009</a:t>
+              <a:t>10/18/2009</a:t>
             </a:fld>
             <a:endParaRPr lang="en-US"/>
           </a:p>
@@ -2260,7 +2264,7 @@
             <a:fld id="{1D8BD707-D9CF-40AE-B4C6-C98DA3205C09}" type="datetimeFigureOut">
               <a:rPr lang="en-US" smtClean="0"/>
               <a:pPr/>
-              <a:t>7/23/2009</a:t>
+              <a:t>10/18/2009</a:t>
             </a:fld>
             <a:endParaRPr lang="en-US"/>
           </a:p>
@@ -2375,7 +2379,7 @@
             <a:fld id="{1D8BD707-D9CF-40AE-B4C6-C98DA3205C09}" type="datetimeFigureOut">
               <a:rPr lang="en-US" smtClean="0"/>
               <a:pPr/>
-              <a:t>7/23/2009</a:t>
+              <a:t>10/18/2009</a:t>
             </a:fld>
             <a:endParaRPr lang="en-US"/>
           </a:p>
@@ -2467,7 +2471,7 @@
             <a:fld id="{1D8BD707-D9CF-40AE-B4C6-C98DA3205C09}" type="datetimeFigureOut">
               <a:rPr lang="en-US" smtClean="0"/>
               <a:pPr/>
-              <a:t>7/23/2009</a:t>
+              <a:t>10/18/2009</a:t>
             </a:fld>
             <a:endParaRPr lang="en-US"/>
           </a:p>
@@ -2741,7 +2745,7 @@
             <a:fld id="{1D8BD707-D9CF-40AE-B4C6-C98DA3205C09}" type="datetimeFigureOut">
               <a:rPr lang="en-US" smtClean="0"/>
               <a:pPr/>
-              <a:t>7/23/2009</a:t>
+              <a:t>10/18/2009</a:t>
             </a:fld>
             <a:endParaRPr lang="en-US"/>
           </a:p>
@@ -2991,7 +2995,7 @@
             <a:fld id="{1D8BD707-D9CF-40AE-B4C6-C98DA3205C09}" type="datetimeFigureOut">
               <a:rPr lang="en-US" smtClean="0"/>
               <a:pPr/>
-              <a:t>7/23/2009</a:t>
+              <a:t>10/18/2009</a:t>
             </a:fld>
             <a:endParaRPr lang="en-US"/>
           </a:p>
@@ -3201,7 +3205,7 @@
             <a:fld id="{1D8BD707-D9CF-40AE-B4C6-C98DA3205C09}" type="datetimeFigureOut">
               <a:rPr lang="en-US" smtClean="0"/>
               <a:pPr/>
-              <a:t>7/23/2009</a:t>
+              <a:t>10/18/2009</a:t>
             </a:fld>
             <a:endParaRPr lang="en-US"/>
           </a:p>
@@ -3840,6 +3844,9 @@
           <a:prstGeom prst="roundRect">
             <a:avLst/>
           </a:prstGeom>
+          <a:solidFill>
+            <a:srgbClr val="FF0000"/>
+          </a:solidFill>
         </p:spPr>
         <p:style>
           <a:lnRef idx="2">
@@ -3911,7 +3918,15 @@
             <a:pPr algn="ctr"/>
             <a:r>
               <a:rPr lang="en-US" dirty="0" smtClean="0"/>
-              <a:t>chemical entities in solution</a:t>
+              <a:t>chemical </a:t>
+            </a:r>
+            <a:r>
+              <a:rPr lang="en-US" dirty="0" smtClean="0"/>
+              <a:t> </a:t>
+            </a:r>
+            <a:r>
+              <a:rPr lang="en-US" dirty="0" smtClean="0"/>
+              <a:t>solution</a:t>
             </a:r>
             <a:endParaRPr lang="en-US" dirty="0"/>
           </a:p>
@@ -4151,19 +4166,110 @@
           </a:fontRef>
         </p:style>
       </p:cxnSp>
+      <p:sp>
+        <p:nvSpPr>
+          <p:cNvPr id="47" name="Rounded Rectangle 46"/>
+          <p:cNvSpPr/>
+          <p:nvPr/>
+        </p:nvSpPr>
+        <p:spPr>
+          <a:xfrm>
+            <a:off x="3886200" y="533400"/>
+            <a:ext cx="1143000" cy="533400"/>
+          </a:xfrm>
+          <a:prstGeom prst="roundRect">
+            <a:avLst/>
+          </a:prstGeom>
+        </p:spPr>
+        <p:style>
+          <a:lnRef idx="2">
+            <a:schemeClr val="accent1">
+              <a:shade val="50000"/>
+            </a:schemeClr>
+          </a:lnRef>
+          <a:fillRef idx="1">
+            <a:schemeClr val="accent1"/>
+          </a:fillRef>
+          <a:effectRef idx="0">
+            <a:schemeClr val="accent1"/>
+          </a:effectRef>
+          <a:fontRef idx="minor">
+            <a:schemeClr val="lt1"/>
+          </a:fontRef>
+        </p:style>
+        <p:txBody>
+          <a:bodyPr rtlCol="0" anchor="ctr"/>
+          <a:lstStyle/>
+          <a:p>
+            <a:pPr algn="ctr"/>
+            <a:r>
+              <a:rPr lang="en-US" dirty="0" smtClean="0"/>
+              <a:t>cell culture</a:t>
+            </a:r>
+            <a:endParaRPr lang="en-US" dirty="0"/>
+          </a:p>
+        </p:txBody>
+      </p:sp>
+      <p:sp>
+        <p:nvSpPr>
+          <p:cNvPr id="48" name="Rounded Rectangle 47"/>
+          <p:cNvSpPr/>
+          <p:nvPr/>
+        </p:nvSpPr>
+        <p:spPr>
+          <a:xfrm>
+            <a:off x="1600200" y="1219200"/>
+            <a:ext cx="1905000" cy="533400"/>
+          </a:xfrm>
+          <a:prstGeom prst="roundRect">
+            <a:avLst/>
+          </a:prstGeom>
+          <a:solidFill>
+            <a:schemeClr val="accent1"/>
+          </a:solidFill>
+        </p:spPr>
+        <p:style>
+          <a:lnRef idx="2">
+            <a:schemeClr val="accent1">
+              <a:shade val="50000"/>
+            </a:schemeClr>
+          </a:lnRef>
+          <a:fillRef idx="1">
+            <a:schemeClr val="accent1"/>
+          </a:fillRef>
+          <a:effectRef idx="0">
+            <a:schemeClr val="accent1"/>
+          </a:effectRef>
+          <a:fontRef idx="minor">
+            <a:schemeClr val="lt1"/>
+          </a:fontRef>
+        </p:style>
+        <p:txBody>
+          <a:bodyPr rtlCol="0" anchor="ctr"/>
+          <a:lstStyle/>
+          <a:p>
+            <a:pPr algn="ctr"/>
+            <a:r>
+              <a:rPr lang="en-US" dirty="0" smtClean="0"/>
+              <a:t>organization</a:t>
+            </a:r>
+            <a:endParaRPr lang="en-US" dirty="0"/>
+          </a:p>
+        </p:txBody>
+      </p:sp>
       <p:cxnSp>
         <p:nvCxnSpPr>
-          <p:cNvPr id="42" name="Straight Arrow Connector 41"/>
+          <p:cNvPr id="49" name="Straight Arrow Connector 48"/>
           <p:cNvCxnSpPr>
-            <a:stCxn id="8" idx="3"/>
-            <a:endCxn id="43" idx="1"/>
+            <a:stCxn id="4" idx="3"/>
+            <a:endCxn id="48" idx="1"/>
           </p:cNvCxnSpPr>
           <p:nvPr/>
         </p:nvCxnSpPr>
         <p:spPr>
-          <a:xfrm>
-            <a:off x="3505200" y="800100"/>
-            <a:ext cx="457200" cy="1588"/>
+          <a:xfrm flipV="1">
+            <a:off x="1143000" y="1485900"/>
+            <a:ext cx="457200" cy="1752600"/>
           </a:xfrm>
           <a:prstGeom prst="straightConnector1">
             <a:avLst/>
@@ -4192,18 +4298,21 @@
       </p:cxnSp>
       <p:sp>
         <p:nvSpPr>
-          <p:cNvPr id="43" name="Rounded Rectangle 42"/>
+          <p:cNvPr id="52" name="Rounded Rectangle 51"/>
           <p:cNvSpPr/>
           <p:nvPr/>
         </p:nvSpPr>
         <p:spPr>
           <a:xfrm>
-            <a:off x="3962400" y="533400"/>
-            <a:ext cx="1143000" cy="533400"/>
+            <a:off x="1600200" y="3962400"/>
+            <a:ext cx="1905000" cy="533400"/>
           </a:xfrm>
           <a:prstGeom prst="roundRect">
             <a:avLst/>
           </a:prstGeom>
+          <a:solidFill>
+            <a:srgbClr val="FF0000"/>
+          </a:solidFill>
         </p:spPr>
         <p:style>
           <a:lnRef idx="2">
@@ -4228,98 +4337,14 @@
             <a:pPr algn="ctr"/>
             <a:r>
               <a:rPr lang="en-US" dirty="0" smtClean="0"/>
-              <a:t>device</a:t>
-            </a:r>
-            <a:endParaRPr lang="en-US" dirty="0"/>
-          </a:p>
-        </p:txBody>
-      </p:sp>
-      <p:sp>
-        <p:nvSpPr>
-          <p:cNvPr id="47" name="Rounded Rectangle 46"/>
-          <p:cNvSpPr/>
-          <p:nvPr/>
-        </p:nvSpPr>
-        <p:spPr>
-          <a:xfrm>
-            <a:off x="3962400" y="1219200"/>
-            <a:ext cx="1143000" cy="533400"/>
-          </a:xfrm>
-          <a:prstGeom prst="roundRect">
-            <a:avLst/>
-          </a:prstGeom>
-        </p:spPr>
-        <p:style>
-          <a:lnRef idx="2">
-            <a:schemeClr val="accent1">
-              <a:shade val="50000"/>
-            </a:schemeClr>
-          </a:lnRef>
-          <a:fillRef idx="1">
-            <a:schemeClr val="accent1"/>
-          </a:fillRef>
-          <a:effectRef idx="0">
-            <a:schemeClr val="accent1"/>
-          </a:effectRef>
-          <a:fontRef idx="minor">
-            <a:schemeClr val="lt1"/>
-          </a:fontRef>
-        </p:style>
-        <p:txBody>
-          <a:bodyPr rtlCol="0" anchor="ctr"/>
-          <a:lstStyle/>
-          <a:p>
-            <a:pPr algn="ctr"/>
-            <a:r>
+              <a:t>cell</a:t>
+            </a:r>
+            <a:br>
               <a:rPr lang="en-US" dirty="0" smtClean="0"/>
-              <a:t>cell culture</a:t>
-            </a:r>
-            <a:endParaRPr lang="en-US" dirty="0"/>
-          </a:p>
-        </p:txBody>
-      </p:sp>
-      <p:sp>
-        <p:nvSpPr>
-          <p:cNvPr id="48" name="Rounded Rectangle 47"/>
-          <p:cNvSpPr/>
-          <p:nvPr/>
-        </p:nvSpPr>
-        <p:spPr>
-          <a:xfrm>
-            <a:off x="1600200" y="1219200"/>
-            <a:ext cx="1905000" cy="533400"/>
-          </a:xfrm>
-          <a:prstGeom prst="roundRect">
-            <a:avLst/>
-          </a:prstGeom>
-          <a:solidFill>
-            <a:schemeClr val="accent1"/>
-          </a:solidFill>
-        </p:spPr>
-        <p:style>
-          <a:lnRef idx="2">
-            <a:schemeClr val="accent1">
-              <a:shade val="50000"/>
-            </a:schemeClr>
-          </a:lnRef>
-          <a:fillRef idx="1">
-            <a:schemeClr val="accent1"/>
-          </a:fillRef>
-          <a:effectRef idx="0">
-            <a:schemeClr val="accent1"/>
-          </a:effectRef>
-          <a:fontRef idx="minor">
-            <a:schemeClr val="lt1"/>
-          </a:fontRef>
-        </p:style>
-        <p:txBody>
-          <a:bodyPr rtlCol="0" anchor="ctr"/>
-          <a:lstStyle/>
-          <a:p>
-            <a:pPr algn="ctr"/>
+            </a:br>
             <a:r>
               <a:rPr lang="en-US" dirty="0" smtClean="0"/>
-              <a:t>organization</a:t>
+              <a:t>(Cell Ontology)</a:t>
             </a:r>
             <a:endParaRPr lang="en-US" dirty="0"/>
           </a:p>
@@ -4327,17 +4352,17 @@
       </p:sp>
       <p:cxnSp>
         <p:nvCxnSpPr>
-          <p:cNvPr id="49" name="Straight Arrow Connector 48"/>
+          <p:cNvPr id="53" name="Straight Arrow Connector 52"/>
           <p:cNvCxnSpPr>
             <a:stCxn id="4" idx="3"/>
-            <a:endCxn id="48" idx="1"/>
+            <a:endCxn id="52" idx="1"/>
           </p:cNvCxnSpPr>
           <p:nvPr/>
         </p:nvCxnSpPr>
         <p:spPr>
-          <a:xfrm flipV="1">
-            <a:off x="1143000" y="1485900"/>
-            <a:ext cx="457200" cy="1752600"/>
+          <a:xfrm>
+            <a:off x="1143000" y="3238500"/>
+            <a:ext cx="457200" cy="990600"/>
           </a:xfrm>
           <a:prstGeom prst="straightConnector1">
             <a:avLst/>
@@ -4366,106 +4391,13 @@
       </p:cxnSp>
       <p:sp>
         <p:nvSpPr>
-          <p:cNvPr id="52" name="Rounded Rectangle 51"/>
-          <p:cNvSpPr/>
-          <p:nvPr/>
-        </p:nvSpPr>
-        <p:spPr>
-          <a:xfrm>
-            <a:off x="1600200" y="3962400"/>
-            <a:ext cx="1905000" cy="533400"/>
-          </a:xfrm>
-          <a:prstGeom prst="roundRect">
-            <a:avLst/>
-          </a:prstGeom>
-          <a:solidFill>
-            <a:srgbClr val="FF0000"/>
-          </a:solidFill>
-        </p:spPr>
-        <p:style>
-          <a:lnRef idx="2">
-            <a:schemeClr val="accent1">
-              <a:shade val="50000"/>
-            </a:schemeClr>
-          </a:lnRef>
-          <a:fillRef idx="1">
-            <a:schemeClr val="accent1"/>
-          </a:fillRef>
-          <a:effectRef idx="0">
-            <a:schemeClr val="accent1"/>
-          </a:effectRef>
-          <a:fontRef idx="minor">
-            <a:schemeClr val="lt1"/>
-          </a:fontRef>
-        </p:style>
-        <p:txBody>
-          <a:bodyPr rtlCol="0" anchor="ctr"/>
-          <a:lstStyle/>
-          <a:p>
-            <a:pPr algn="ctr"/>
-            <a:r>
-              <a:rPr lang="en-US" dirty="0" smtClean="0"/>
-              <a:t>cell</a:t>
-            </a:r>
-            <a:br>
-              <a:rPr lang="en-US" dirty="0" smtClean="0"/>
-            </a:br>
-            <a:r>
-              <a:rPr lang="en-US" dirty="0" smtClean="0"/>
-              <a:t>(Cell Ontology)</a:t>
-            </a:r>
-            <a:endParaRPr lang="en-US" dirty="0"/>
-          </a:p>
-        </p:txBody>
-      </p:sp>
-      <p:cxnSp>
-        <p:nvCxnSpPr>
-          <p:cNvPr id="53" name="Straight Arrow Connector 52"/>
-          <p:cNvCxnSpPr>
-            <a:stCxn id="4" idx="3"/>
-            <a:endCxn id="52" idx="1"/>
-          </p:cNvCxnSpPr>
-          <p:nvPr/>
-        </p:nvCxnSpPr>
-        <p:spPr>
-          <a:xfrm>
-            <a:off x="1143000" y="3238500"/>
-            <a:ext cx="457200" cy="990600"/>
-          </a:xfrm>
-          <a:prstGeom prst="straightConnector1">
-            <a:avLst/>
-          </a:prstGeom>
-          <a:ln w="28575">
-            <a:solidFill>
-              <a:schemeClr val="tx1"/>
-            </a:solidFill>
-            <a:tailEnd type="arrow"/>
-          </a:ln>
-        </p:spPr>
-        <p:style>
-          <a:lnRef idx="1">
-            <a:schemeClr val="accent1"/>
-          </a:lnRef>
-          <a:fillRef idx="0">
-            <a:schemeClr val="accent1"/>
-          </a:fillRef>
-          <a:effectRef idx="0">
-            <a:schemeClr val="accent1"/>
-          </a:effectRef>
-          <a:fontRef idx="minor">
-            <a:schemeClr val="tx1"/>
-          </a:fontRef>
-        </p:style>
-      </p:cxnSp>
-      <p:sp>
-        <p:nvSpPr>
           <p:cNvPr id="62" name="Rounded Rectangle 61"/>
           <p:cNvSpPr/>
           <p:nvPr/>
         </p:nvSpPr>
         <p:spPr>
           <a:xfrm>
-            <a:off x="3962400" y="1905000"/>
+            <a:off x="3886200" y="1219200"/>
             <a:ext cx="1143000" cy="533400"/>
           </a:xfrm>
           <a:prstGeom prst="roundRect">
@@ -4513,7 +4445,7 @@
         <p:spPr>
           <a:xfrm>
             <a:off x="3505200" y="800100"/>
-            <a:ext cx="457200" cy="685800"/>
+            <a:ext cx="381000" cy="1588"/>
           </a:xfrm>
           <a:prstGeom prst="straightConnector1">
             <a:avLst/>
@@ -4552,7 +4484,7 @@
         <p:spPr>
           <a:xfrm>
             <a:off x="3505200" y="800100"/>
-            <a:ext cx="457200" cy="1371600"/>
+            <a:ext cx="381000" cy="685800"/>
           </a:xfrm>
           <a:prstGeom prst="straightConnector1">
             <a:avLst/>
@@ -4587,7 +4519,7 @@
         </p:nvSpPr>
         <p:spPr>
           <a:xfrm>
-            <a:off x="3886200" y="3962400"/>
+            <a:off x="3810000" y="4648200"/>
             <a:ext cx="1219200" cy="533400"/>
           </a:xfrm>
           <a:prstGeom prst="roundRect">
@@ -4631,7 +4563,7 @@
         </p:nvSpPr>
         <p:spPr>
           <a:xfrm>
-            <a:off x="5486400" y="5334000"/>
+            <a:off x="5410200" y="6019800"/>
             <a:ext cx="1524000" cy="533400"/>
           </a:xfrm>
           <a:prstGeom prst="roundRect">
@@ -4661,7 +4593,7 @@
             <a:pPr algn="ctr"/>
             <a:r>
               <a:rPr lang="en-US" dirty="0" smtClean="0"/>
-              <a:t>processing material</a:t>
+              <a:t> material processing</a:t>
             </a:r>
             <a:endParaRPr lang="en-US" dirty="0"/>
           </a:p>
@@ -4675,7 +4607,7 @@
         </p:nvSpPr>
         <p:spPr>
           <a:xfrm>
-            <a:off x="5486400" y="2590800"/>
+            <a:off x="5410200" y="3276600"/>
             <a:ext cx="1524000" cy="533400"/>
           </a:xfrm>
           <a:prstGeom prst="roundRect">
@@ -4719,7 +4651,7 @@
         </p:nvSpPr>
         <p:spPr>
           <a:xfrm>
-            <a:off x="5486400" y="3276600"/>
+            <a:off x="5410200" y="3962400"/>
             <a:ext cx="1524000" cy="533400"/>
           </a:xfrm>
           <a:prstGeom prst="roundRect">
@@ -4763,7 +4695,7 @@
         </p:nvSpPr>
         <p:spPr>
           <a:xfrm>
-            <a:off x="5486400" y="3962400"/>
+            <a:off x="5410200" y="4648200"/>
             <a:ext cx="1524000" cy="533400"/>
           </a:xfrm>
           <a:prstGeom prst="roundRect">
@@ -4807,7 +4739,7 @@
         </p:nvSpPr>
         <p:spPr>
           <a:xfrm>
-            <a:off x="5486400" y="4648200"/>
+            <a:off x="5410200" y="5334000"/>
             <a:ext cx="1524000" cy="533400"/>
           </a:xfrm>
           <a:prstGeom prst="roundRect">
@@ -4854,7 +4786,7 @@
         </p:nvCxnSpPr>
         <p:spPr>
           <a:xfrm flipV="1">
-            <a:off x="5105400" y="2857500"/>
+            <a:off x="5029200" y="3543300"/>
             <a:ext cx="381000" cy="1371600"/>
           </a:xfrm>
           <a:prstGeom prst="straightConnector1">
@@ -4893,7 +4825,7 @@
         </p:nvCxnSpPr>
         <p:spPr>
           <a:xfrm flipV="1">
-            <a:off x="5105400" y="3543300"/>
+            <a:off x="5029200" y="4229100"/>
             <a:ext cx="381000" cy="685800"/>
           </a:xfrm>
           <a:prstGeom prst="straightConnector1">
@@ -4932,7 +4864,7 @@
         </p:nvCxnSpPr>
         <p:spPr>
           <a:xfrm>
-            <a:off x="5105400" y="4229100"/>
+            <a:off x="5029200" y="4914900"/>
             <a:ext cx="381000" cy="1588"/>
           </a:xfrm>
           <a:prstGeom prst="straightConnector1">
@@ -4971,7 +4903,7 @@
         </p:nvCxnSpPr>
         <p:spPr>
           <a:xfrm>
-            <a:off x="5105400" y="4229100"/>
+            <a:off x="5029200" y="4914900"/>
             <a:ext cx="381000" cy="685800"/>
           </a:xfrm>
           <a:prstGeom prst="straightConnector1">
@@ -5010,7 +4942,7 @@
         </p:nvCxnSpPr>
         <p:spPr>
           <a:xfrm>
-            <a:off x="5105400" y="4229100"/>
+            <a:off x="5029200" y="4914900"/>
             <a:ext cx="381000" cy="1371600"/>
           </a:xfrm>
           <a:prstGeom prst="straightConnector1">
@@ -5040,13 +4972,13 @@
       </p:cxnSp>
       <p:sp>
         <p:nvSpPr>
-          <p:cNvPr id="112" name="Rounded Rectangle 111"/>
+          <p:cNvPr id="113" name="Rounded Rectangle 112"/>
           <p:cNvSpPr/>
           <p:nvPr/>
         </p:nvSpPr>
         <p:spPr>
           <a:xfrm>
-            <a:off x="7467600" y="4648200"/>
+            <a:off x="7391400" y="6019800"/>
             <a:ext cx="1600200" cy="533400"/>
           </a:xfrm>
           <a:prstGeom prst="roundRect">
@@ -5076,50 +5008,6 @@
             <a:pPr algn="ctr"/>
             <a:r>
               <a:rPr lang="en-US" dirty="0" smtClean="0"/>
-              <a:t>material separation</a:t>
-            </a:r>
-            <a:endParaRPr lang="en-US" dirty="0"/>
-          </a:p>
-        </p:txBody>
-      </p:sp>
-      <p:sp>
-        <p:nvSpPr>
-          <p:cNvPr id="113" name="Rounded Rectangle 112"/>
-          <p:cNvSpPr/>
-          <p:nvPr/>
-        </p:nvSpPr>
-        <p:spPr>
-          <a:xfrm>
-            <a:off x="7467600" y="5334000"/>
-            <a:ext cx="1600200" cy="533400"/>
-          </a:xfrm>
-          <a:prstGeom prst="roundRect">
-            <a:avLst/>
-          </a:prstGeom>
-        </p:spPr>
-        <p:style>
-          <a:lnRef idx="2">
-            <a:schemeClr val="accent1">
-              <a:shade val="50000"/>
-            </a:schemeClr>
-          </a:lnRef>
-          <a:fillRef idx="1">
-            <a:schemeClr val="accent1"/>
-          </a:fillRef>
-          <a:effectRef idx="0">
-            <a:schemeClr val="accent1"/>
-          </a:effectRef>
-          <a:fontRef idx="minor">
-            <a:schemeClr val="lt1"/>
-          </a:fontRef>
-        </p:style>
-        <p:txBody>
-          <a:bodyPr rtlCol="0" anchor="ctr"/>
-          <a:lstStyle/>
-          <a:p>
-            <a:pPr algn="ctr"/>
-            <a:r>
-              <a:rPr lang="en-US" dirty="0" smtClean="0"/>
               <a:t>material combination</a:t>
             </a:r>
             <a:endParaRPr lang="en-US" dirty="0"/>
@@ -5134,7 +5022,7 @@
         </p:nvSpPr>
         <p:spPr>
           <a:xfrm>
-            <a:off x="7467600" y="3962400"/>
+            <a:off x="7391400" y="5410200"/>
             <a:ext cx="1600200" cy="533400"/>
           </a:xfrm>
           <a:prstGeom prst="roundRect">
@@ -5181,47 +5069,8 @@
         </p:nvCxnSpPr>
         <p:spPr>
           <a:xfrm>
-            <a:off x="7010400" y="5600700"/>
+            <a:off x="6934200" y="6286500"/>
             <a:ext cx="457200" cy="1588"/>
-          </a:xfrm>
-          <a:prstGeom prst="straightConnector1">
-            <a:avLst/>
-          </a:prstGeom>
-          <a:ln w="28575">
-            <a:solidFill>
-              <a:schemeClr val="tx1"/>
-            </a:solidFill>
-            <a:tailEnd type="arrow"/>
-          </a:ln>
-        </p:spPr>
-        <p:style>
-          <a:lnRef idx="1">
-            <a:schemeClr val="accent1"/>
-          </a:lnRef>
-          <a:fillRef idx="0">
-            <a:schemeClr val="accent1"/>
-          </a:fillRef>
-          <a:effectRef idx="0">
-            <a:schemeClr val="accent1"/>
-          </a:effectRef>
-          <a:fontRef idx="minor">
-            <a:schemeClr val="tx1"/>
-          </a:fontRef>
-        </p:style>
-      </p:cxnSp>
-      <p:cxnSp>
-        <p:nvCxnSpPr>
-          <p:cNvPr id="118" name="Straight Arrow Connector 117"/>
-          <p:cNvCxnSpPr>
-            <a:stCxn id="89" idx="3"/>
-            <a:endCxn id="112" idx="1"/>
-          </p:cNvCxnSpPr>
-          <p:nvPr/>
-        </p:nvCxnSpPr>
-        <p:spPr>
-          <a:xfrm flipV="1">
-            <a:off x="7010400" y="4914900"/>
-            <a:ext cx="457200" cy="685800"/>
           </a:xfrm>
           <a:prstGeom prst="straightConnector1">
             <a:avLst/>
@@ -5259,8 +5108,385 @@
         </p:nvCxnSpPr>
         <p:spPr>
           <a:xfrm flipV="1">
-            <a:off x="7010400" y="4229100"/>
-            <a:ext cx="457200" cy="1371600"/>
+            <a:off x="6934200" y="5676900"/>
+            <a:ext cx="457200" cy="609600"/>
+          </a:xfrm>
+          <a:prstGeom prst="straightConnector1">
+            <a:avLst/>
+          </a:prstGeom>
+          <a:ln w="28575">
+            <a:solidFill>
+              <a:schemeClr val="tx1"/>
+            </a:solidFill>
+            <a:tailEnd type="arrow"/>
+          </a:ln>
+        </p:spPr>
+        <p:style>
+          <a:lnRef idx="1">
+            <a:schemeClr val="accent1"/>
+          </a:lnRef>
+          <a:fillRef idx="0">
+            <a:schemeClr val="accent1"/>
+          </a:fillRef>
+          <a:effectRef idx="0">
+            <a:schemeClr val="accent1"/>
+          </a:effectRef>
+          <a:fontRef idx="minor">
+            <a:schemeClr val="tx1"/>
+          </a:fontRef>
+        </p:style>
+      </p:cxnSp>
+      <p:sp>
+        <p:nvSpPr>
+          <p:cNvPr id="59" name="Rounded Rectangle 58"/>
+          <p:cNvSpPr/>
+          <p:nvPr/>
+        </p:nvSpPr>
+        <p:spPr>
+          <a:xfrm>
+            <a:off x="5334000" y="1066800"/>
+            <a:ext cx="1524000" cy="990600"/>
+          </a:xfrm>
+          <a:prstGeom prst="roundRect">
+            <a:avLst/>
+          </a:prstGeom>
+        </p:spPr>
+        <p:style>
+          <a:lnRef idx="2">
+            <a:schemeClr val="accent1">
+              <a:shade val="50000"/>
+            </a:schemeClr>
+          </a:lnRef>
+          <a:fillRef idx="1">
+            <a:schemeClr val="accent1"/>
+          </a:fillRef>
+          <a:effectRef idx="0">
+            <a:schemeClr val="accent1"/>
+          </a:effectRef>
+          <a:fontRef idx="minor">
+            <a:schemeClr val="lt1"/>
+          </a:fontRef>
+        </p:style>
+        <p:txBody>
+          <a:bodyPr rtlCol="0" anchor="ctr"/>
+          <a:lstStyle/>
+          <a:p>
+            <a:pPr algn="ctr"/>
+            <a:r>
+              <a:rPr lang="en-US" dirty="0" smtClean="0"/>
+              <a:t>I</a:t>
+            </a:r>
+            <a:r>
+              <a:rPr lang="en-US" dirty="0" smtClean="0"/>
+              <a:t>nformation content entity</a:t>
+            </a:r>
+            <a:endParaRPr lang="en-US" dirty="0"/>
+          </a:p>
+        </p:txBody>
+      </p:sp>
+      <p:sp>
+        <p:nvSpPr>
+          <p:cNvPr id="61" name="Rounded Rectangle 60"/>
+          <p:cNvSpPr/>
+          <p:nvPr/>
+        </p:nvSpPr>
+        <p:spPr>
+          <a:xfrm>
+            <a:off x="7239000" y="609600"/>
+            <a:ext cx="1524000" cy="533400"/>
+          </a:xfrm>
+          <a:prstGeom prst="roundRect">
+            <a:avLst/>
+          </a:prstGeom>
+        </p:spPr>
+        <p:style>
+          <a:lnRef idx="2">
+            <a:schemeClr val="accent1">
+              <a:shade val="50000"/>
+            </a:schemeClr>
+          </a:lnRef>
+          <a:fillRef idx="1">
+            <a:schemeClr val="accent1"/>
+          </a:fillRef>
+          <a:effectRef idx="0">
+            <a:schemeClr val="accent1"/>
+          </a:effectRef>
+          <a:fontRef idx="minor">
+            <a:schemeClr val="lt1"/>
+          </a:fontRef>
+        </p:style>
+        <p:txBody>
+          <a:bodyPr rtlCol="0" anchor="ctr"/>
+          <a:lstStyle/>
+          <a:p>
+            <a:pPr algn="ctr"/>
+            <a:r>
+              <a:rPr lang="en-US" dirty="0" smtClean="0"/>
+              <a:t>data item</a:t>
+            </a:r>
+            <a:endParaRPr lang="en-US" dirty="0"/>
+          </a:p>
+        </p:txBody>
+      </p:sp>
+      <p:sp>
+        <p:nvSpPr>
+          <p:cNvPr id="64" name="Rounded Rectangle 63"/>
+          <p:cNvSpPr/>
+          <p:nvPr/>
+        </p:nvSpPr>
+        <p:spPr>
+          <a:xfrm>
+            <a:off x="7239000" y="1295400"/>
+            <a:ext cx="1524000" cy="533400"/>
+          </a:xfrm>
+          <a:prstGeom prst="roundRect">
+            <a:avLst/>
+          </a:prstGeom>
+        </p:spPr>
+        <p:style>
+          <a:lnRef idx="2">
+            <a:schemeClr val="accent1">
+              <a:shade val="50000"/>
+            </a:schemeClr>
+          </a:lnRef>
+          <a:fillRef idx="1">
+            <a:schemeClr val="accent1"/>
+          </a:fillRef>
+          <a:effectRef idx="0">
+            <a:schemeClr val="accent1"/>
+          </a:effectRef>
+          <a:fontRef idx="minor">
+            <a:schemeClr val="lt1"/>
+          </a:fontRef>
+        </p:style>
+        <p:txBody>
+          <a:bodyPr rtlCol="0" anchor="ctr"/>
+          <a:lstStyle/>
+          <a:p>
+            <a:pPr algn="ctr"/>
+            <a:r>
+              <a:rPr lang="en-US" dirty="0" smtClean="0"/>
+              <a:t>report</a:t>
+            </a:r>
+            <a:endParaRPr lang="en-US" dirty="0"/>
+          </a:p>
+        </p:txBody>
+      </p:sp>
+      <p:sp>
+        <p:nvSpPr>
+          <p:cNvPr id="65" name="Rounded Rectangle 64"/>
+          <p:cNvSpPr/>
+          <p:nvPr/>
+        </p:nvSpPr>
+        <p:spPr>
+          <a:xfrm>
+            <a:off x="7239000" y="1981200"/>
+            <a:ext cx="1524000" cy="533400"/>
+          </a:xfrm>
+          <a:prstGeom prst="roundRect">
+            <a:avLst/>
+          </a:prstGeom>
+        </p:spPr>
+        <p:style>
+          <a:lnRef idx="2">
+            <a:schemeClr val="accent1">
+              <a:shade val="50000"/>
+            </a:schemeClr>
+          </a:lnRef>
+          <a:fillRef idx="1">
+            <a:schemeClr val="accent1"/>
+          </a:fillRef>
+          <a:effectRef idx="0">
+            <a:schemeClr val="accent1"/>
+          </a:effectRef>
+          <a:fontRef idx="minor">
+            <a:schemeClr val="lt1"/>
+          </a:fontRef>
+        </p:style>
+        <p:txBody>
+          <a:bodyPr rtlCol="0" anchor="ctr"/>
+          <a:lstStyle/>
+          <a:p>
+            <a:pPr algn="ctr"/>
+            <a:r>
+              <a:rPr lang="en-US" dirty="0" smtClean="0"/>
+              <a:t>figure</a:t>
+            </a:r>
+            <a:endParaRPr lang="en-US" dirty="0"/>
+          </a:p>
+        </p:txBody>
+      </p:sp>
+      <p:cxnSp>
+        <p:nvCxnSpPr>
+          <p:cNvPr id="67" name="Straight Arrow Connector 66"/>
+          <p:cNvCxnSpPr>
+            <a:stCxn id="59" idx="3"/>
+            <a:endCxn id="61" idx="1"/>
+          </p:cNvCxnSpPr>
+          <p:nvPr/>
+        </p:nvCxnSpPr>
+        <p:spPr>
+          <a:xfrm flipV="1">
+            <a:off x="6858000" y="876300"/>
+            <a:ext cx="381000" cy="685800"/>
+          </a:xfrm>
+          <a:prstGeom prst="straightConnector1">
+            <a:avLst/>
+          </a:prstGeom>
+          <a:ln w="28575">
+            <a:solidFill>
+              <a:schemeClr val="tx1"/>
+            </a:solidFill>
+            <a:tailEnd type="arrow"/>
+          </a:ln>
+        </p:spPr>
+        <p:style>
+          <a:lnRef idx="1">
+            <a:schemeClr val="accent1"/>
+          </a:lnRef>
+          <a:fillRef idx="0">
+            <a:schemeClr val="accent1"/>
+          </a:fillRef>
+          <a:effectRef idx="0">
+            <a:schemeClr val="accent1"/>
+          </a:effectRef>
+          <a:fontRef idx="minor">
+            <a:schemeClr val="tx1"/>
+          </a:fontRef>
+        </p:style>
+      </p:cxnSp>
+      <p:cxnSp>
+        <p:nvCxnSpPr>
+          <p:cNvPr id="68" name="Straight Arrow Connector 67"/>
+          <p:cNvCxnSpPr>
+            <a:stCxn id="59" idx="3"/>
+            <a:endCxn id="64" idx="1"/>
+          </p:cNvCxnSpPr>
+          <p:nvPr/>
+        </p:nvCxnSpPr>
+        <p:spPr>
+          <a:xfrm>
+            <a:off x="6858000" y="1562100"/>
+            <a:ext cx="381000" cy="1588"/>
+          </a:xfrm>
+          <a:prstGeom prst="straightConnector1">
+            <a:avLst/>
+          </a:prstGeom>
+          <a:ln w="28575">
+            <a:solidFill>
+              <a:schemeClr val="tx1"/>
+            </a:solidFill>
+            <a:tailEnd type="arrow"/>
+          </a:ln>
+        </p:spPr>
+        <p:style>
+          <a:lnRef idx="1">
+            <a:schemeClr val="accent1"/>
+          </a:lnRef>
+          <a:fillRef idx="0">
+            <a:schemeClr val="accent1"/>
+          </a:fillRef>
+          <a:effectRef idx="0">
+            <a:schemeClr val="accent1"/>
+          </a:effectRef>
+          <a:fontRef idx="minor">
+            <a:schemeClr val="tx1"/>
+          </a:fontRef>
+        </p:style>
+      </p:cxnSp>
+      <p:cxnSp>
+        <p:nvCxnSpPr>
+          <p:cNvPr id="69" name="Straight Arrow Connector 68"/>
+          <p:cNvCxnSpPr>
+            <a:stCxn id="59" idx="3"/>
+            <a:endCxn id="65" idx="1"/>
+          </p:cNvCxnSpPr>
+          <p:nvPr/>
+        </p:nvCxnSpPr>
+        <p:spPr>
+          <a:xfrm>
+            <a:off x="6858000" y="1562100"/>
+            <a:ext cx="381000" cy="685800"/>
+          </a:xfrm>
+          <a:prstGeom prst="straightConnector1">
+            <a:avLst/>
+          </a:prstGeom>
+          <a:ln w="28575">
+            <a:solidFill>
+              <a:schemeClr val="tx1"/>
+            </a:solidFill>
+            <a:tailEnd type="arrow"/>
+          </a:ln>
+        </p:spPr>
+        <p:style>
+          <a:lnRef idx="1">
+            <a:schemeClr val="accent1"/>
+          </a:lnRef>
+          <a:fillRef idx="0">
+            <a:schemeClr val="accent1"/>
+          </a:fillRef>
+          <a:effectRef idx="0">
+            <a:schemeClr val="accent1"/>
+          </a:effectRef>
+          <a:fontRef idx="minor">
+            <a:schemeClr val="tx1"/>
+          </a:fontRef>
+        </p:style>
+      </p:cxnSp>
+      <p:sp>
+        <p:nvSpPr>
+          <p:cNvPr id="96" name="Rounded Rectangle 95"/>
+          <p:cNvSpPr/>
+          <p:nvPr/>
+        </p:nvSpPr>
+        <p:spPr>
+          <a:xfrm>
+            <a:off x="7239000" y="2667000"/>
+            <a:ext cx="1524000" cy="533400"/>
+          </a:xfrm>
+          <a:prstGeom prst="roundRect">
+            <a:avLst/>
+          </a:prstGeom>
+        </p:spPr>
+        <p:style>
+          <a:lnRef idx="2">
+            <a:schemeClr val="accent1">
+              <a:shade val="50000"/>
+            </a:schemeClr>
+          </a:lnRef>
+          <a:fillRef idx="1">
+            <a:schemeClr val="accent1"/>
+          </a:fillRef>
+          <a:effectRef idx="0">
+            <a:schemeClr val="accent1"/>
+          </a:effectRef>
+          <a:fontRef idx="minor">
+            <a:schemeClr val="lt1"/>
+          </a:fontRef>
+        </p:style>
+        <p:txBody>
+          <a:bodyPr rtlCol="0" anchor="ctr"/>
+          <a:lstStyle/>
+          <a:p>
+            <a:pPr algn="ctr"/>
+            <a:r>
+              <a:rPr lang="en-US" dirty="0" smtClean="0"/>
+              <a:t>hypothesis</a:t>
+            </a:r>
+            <a:endParaRPr lang="en-US" dirty="0"/>
+          </a:p>
+        </p:txBody>
+      </p:sp>
+      <p:cxnSp>
+        <p:nvCxnSpPr>
+          <p:cNvPr id="98" name="Straight Arrow Connector 97"/>
+          <p:cNvCxnSpPr/>
+          <p:nvPr/>
+        </p:nvCxnSpPr>
+        <p:spPr>
+          <a:xfrm rot="16200000" flipH="1">
+            <a:off x="6381750" y="2076451"/>
+            <a:ext cx="1333500" cy="381000"/>
           </a:xfrm>
           <a:prstGeom prst="straightConnector1">
             <a:avLst/>

</xml_diff>